<commit_message>
Created presentation and final writeup
</commit_message>
<xml_diff>
--- a/Final_Presentation.pptx
+++ b/Final_Presentation.pptx
@@ -107,6 +107,11 @@
       </a:defRPr>
     </a:lvl9pPr>
   </p:defaultTextStyle>
+  <p:extLst>
+    <p:ext uri="{EFAFB233-063F-42B5-8137-9DF3F51BA10A}">
+      <p15:sldGuideLst xmlns:p15="http://schemas.microsoft.com/office/powerpoint/2012/main"/>
+    </p:ext>
+  </p:extLst>
 </p:presentation>
 </file>
 
@@ -336,7 +341,7 @@
           <a:p>
             <a:fld id="{72D5BCD8-24DF-4659-98DF-446EBDAA1C44}" type="datetimeFigureOut">
               <a:rPr lang="en-US" smtClean="0"/>
-              <a:t>12/14/2020</a:t>
+              <a:t>12/15/2020</a:t>
             </a:fld>
             <a:endParaRPr lang="en-US"/>
           </a:p>
@@ -544,7 +549,7 @@
           <a:p>
             <a:fld id="{72D5BCD8-24DF-4659-98DF-446EBDAA1C44}" type="datetimeFigureOut">
               <a:rPr lang="en-US" smtClean="0"/>
-              <a:t>12/14/2020</a:t>
+              <a:t>12/15/2020</a:t>
             </a:fld>
             <a:endParaRPr lang="en-US"/>
           </a:p>
@@ -800,7 +805,7 @@
           <a:p>
             <a:fld id="{72D5BCD8-24DF-4659-98DF-446EBDAA1C44}" type="datetimeFigureOut">
               <a:rPr lang="en-US" smtClean="0"/>
-              <a:t>12/14/2020</a:t>
+              <a:t>12/15/2020</a:t>
             </a:fld>
             <a:endParaRPr lang="en-US"/>
           </a:p>
@@ -974,7 +979,7 @@
           <a:p>
             <a:fld id="{72D5BCD8-24DF-4659-98DF-446EBDAA1C44}" type="datetimeFigureOut">
               <a:rPr lang="en-US" smtClean="0"/>
-              <a:t>12/14/2020</a:t>
+              <a:t>12/15/2020</a:t>
             </a:fld>
             <a:endParaRPr lang="en-US"/>
           </a:p>
@@ -1317,7 +1322,7 @@
           <a:p>
             <a:fld id="{72D5BCD8-24DF-4659-98DF-446EBDAA1C44}" type="datetimeFigureOut">
               <a:rPr lang="en-US" smtClean="0"/>
-              <a:t>12/14/2020</a:t>
+              <a:t>12/15/2020</a:t>
             </a:fld>
             <a:endParaRPr lang="en-US"/>
           </a:p>
@@ -1592,7 +1597,7 @@
           <a:p>
             <a:fld id="{72D5BCD8-24DF-4659-98DF-446EBDAA1C44}" type="datetimeFigureOut">
               <a:rPr lang="en-US" smtClean="0"/>
-              <a:t>12/14/2020</a:t>
+              <a:t>12/15/2020</a:t>
             </a:fld>
             <a:endParaRPr lang="en-US"/>
           </a:p>
@@ -1971,7 +1976,7 @@
           <a:p>
             <a:fld id="{72D5BCD8-24DF-4659-98DF-446EBDAA1C44}" type="datetimeFigureOut">
               <a:rPr lang="en-US" smtClean="0"/>
-              <a:t>12/14/2020</a:t>
+              <a:t>12/15/2020</a:t>
             </a:fld>
             <a:endParaRPr lang="en-US"/>
           </a:p>
@@ -2089,7 +2094,7 @@
           <a:p>
             <a:fld id="{72D5BCD8-24DF-4659-98DF-446EBDAA1C44}" type="datetimeFigureOut">
               <a:rPr lang="en-US" smtClean="0"/>
-              <a:t>12/14/2020</a:t>
+              <a:t>12/15/2020</a:t>
             </a:fld>
             <a:endParaRPr lang="en-US"/>
           </a:p>
@@ -2260,7 +2265,7 @@
           <a:p>
             <a:fld id="{72D5BCD8-24DF-4659-98DF-446EBDAA1C44}" type="datetimeFigureOut">
               <a:rPr lang="en-US" smtClean="0"/>
-              <a:t>12/14/2020</a:t>
+              <a:t>12/15/2020</a:t>
             </a:fld>
             <a:endParaRPr lang="en-US"/>
           </a:p>
@@ -2614,7 +2619,7 @@
           <a:p>
             <a:fld id="{72D5BCD8-24DF-4659-98DF-446EBDAA1C44}" type="datetimeFigureOut">
               <a:rPr lang="en-US" smtClean="0"/>
-              <a:t>12/14/2020</a:t>
+              <a:t>12/15/2020</a:t>
             </a:fld>
             <a:endParaRPr lang="en-US"/>
           </a:p>
@@ -2996,7 +3001,7 @@
           <a:p>
             <a:fld id="{72D5BCD8-24DF-4659-98DF-446EBDAA1C44}" type="datetimeFigureOut">
               <a:rPr lang="en-US" smtClean="0"/>
-              <a:t>12/14/2020</a:t>
+              <a:t>12/15/2020</a:t>
             </a:fld>
             <a:endParaRPr lang="en-US"/>
           </a:p>
@@ -3283,7 +3288,7 @@
           <a:p>
             <a:fld id="{72D5BCD8-24DF-4659-98DF-446EBDAA1C44}" type="datetimeFigureOut">
               <a:rPr lang="en-US" smtClean="0"/>
-              <a:t>12/14/2020</a:t>
+              <a:t>12/15/2020</a:t>
             </a:fld>
             <a:endParaRPr lang="en-US"/>
           </a:p>
@@ -3904,7 +3909,7 @@
           <a:lstStyle/>
           <a:p>
             <a:r>
-              <a:rPr lang="en-US" sz="6200"/>
+              <a:rPr lang="en-US" sz="6200" dirty="0"/>
               <a:t>Analysis of Global Fire Weather Index Trend and Its Correlation to The Oceanic Nino Index in the Amazon Rainforest Region</a:t>
             </a:r>
           </a:p>
@@ -4773,7 +4778,7 @@
       </p:grpSpPr>
       <p:sp>
         <p:nvSpPr>
-          <p:cNvPr id="21" name="Rectangle 20">
+          <p:cNvPr id="38" name="Rectangle 37">
             <a:extLst>
               <a:ext uri="{FF2B5EF4-FFF2-40B4-BE49-F238E27FC236}">
                 <a16:creationId xmlns:a16="http://schemas.microsoft.com/office/drawing/2014/main" id="{BB2B8762-61F0-4F1B-9364-D633EE9D6AF5}"/>
@@ -4828,7 +4833,7 @@
       </p:sp>
       <p:sp>
         <p:nvSpPr>
-          <p:cNvPr id="23" name="Rectangle 22">
+          <p:cNvPr id="40" name="Rectangle 39">
             <a:extLst>
               <a:ext uri="{FF2B5EF4-FFF2-40B4-BE49-F238E27FC236}">
                 <a16:creationId xmlns:a16="http://schemas.microsoft.com/office/drawing/2014/main" id="{E97675C8-1328-460C-9EBF-6B446B67EAD3}"/>
@@ -4883,7 +4888,7 @@
       </p:sp>
       <p:cxnSp>
         <p:nvCxnSpPr>
-          <p:cNvPr id="25" name="Straight Connector 24">
+          <p:cNvPr id="42" name="Straight Connector 41">
             <a:extLst>
               <a:ext uri="{FF2B5EF4-FFF2-40B4-BE49-F238E27FC236}">
                 <a16:creationId xmlns:a16="http://schemas.microsoft.com/office/drawing/2014/main" id="{514EE78B-AF71-4195-A01B-F1165D9233BF}"/>
@@ -4938,7 +4943,7 @@
       </p:cxnSp>
       <p:sp useBgFill="1">
         <p:nvSpPr>
-          <p:cNvPr id="27" name="Rectangle 26">
+          <p:cNvPr id="44" name="Rectangle 43">
             <a:extLst>
               <a:ext uri="{FF2B5EF4-FFF2-40B4-BE49-F238E27FC236}">
                 <a16:creationId xmlns:a16="http://schemas.microsoft.com/office/drawing/2014/main" id="{01C6F51C-53CC-4D4B-98DA-C143852FCF7F}"/>
@@ -5040,7 +5045,7 @@
       </p:sp>
       <p:pic>
         <p:nvPicPr>
-          <p:cNvPr id="14" name="Content Placeholder 13" descr="Map&#10;&#10;Description automatically generated">
+          <p:cNvPr id="14" name="Content Placeholder 13">
             <a:extLst>
               <a:ext uri="{FF2B5EF4-FFF2-40B4-BE49-F238E27FC236}">
                 <a16:creationId xmlns:a16="http://schemas.microsoft.com/office/drawing/2014/main" id="{8E6BA6B5-A13F-4A94-9CBA-9EB824FD245A}"/>
@@ -5062,14 +5067,12 @@
               </a:ext>
             </a:extLst>
           </a:blip>
-          <a:stretch>
-            <a:fillRect/>
-          </a:stretch>
+          <a:stretch/>
         </p:blipFill>
         <p:spPr>
           <a:xfrm>
-            <a:off x="646740" y="863781"/>
-            <a:ext cx="3039446" cy="4559168"/>
+            <a:off x="822551" y="660761"/>
+            <a:ext cx="3179203" cy="4768805"/>
           </a:xfrm>
           <a:prstGeom prst="rect">
             <a:avLst/>
@@ -5078,7 +5081,7 @@
       </p:pic>
       <p:pic>
         <p:nvPicPr>
-          <p:cNvPr id="16" name="Content Placeholder 15" descr="Map&#10;&#10;Description automatically generated">
+          <p:cNvPr id="16" name="Content Placeholder 15">
             <a:extLst>
               <a:ext uri="{FF2B5EF4-FFF2-40B4-BE49-F238E27FC236}">
                 <a16:creationId xmlns:a16="http://schemas.microsoft.com/office/drawing/2014/main" id="{FE40EB30-A263-4543-83F2-9F7BE165C0C3}"/>
@@ -5100,14 +5103,12 @@
               </a:ext>
             </a:extLst>
           </a:blip>
-          <a:stretch>
-            <a:fillRect/>
-          </a:stretch>
+          <a:stretch/>
         </p:blipFill>
         <p:spPr>
           <a:xfrm>
             <a:off x="4001754" y="857163"/>
-            <a:ext cx="3048269" cy="4572403"/>
+            <a:ext cx="3048268" cy="4572403"/>
           </a:xfrm>
           <a:prstGeom prst="rect">
             <a:avLst/>
@@ -5116,7 +5117,7 @@
       </p:pic>
       <p:cxnSp>
         <p:nvCxnSpPr>
-          <p:cNvPr id="29" name="Straight Connector 28">
+          <p:cNvPr id="46" name="Straight Connector 45">
             <a:extLst>
               <a:ext uri="{FF2B5EF4-FFF2-40B4-BE49-F238E27FC236}">
                 <a16:creationId xmlns:a16="http://schemas.microsoft.com/office/drawing/2014/main" id="{613AFA59-28DC-4A81-8ADB-6EE5C6322202}"/>
@@ -5170,7 +5171,7 @@
       </p:cxnSp>
       <p:sp>
         <p:nvSpPr>
-          <p:cNvPr id="31" name="Rectangle 30">
+          <p:cNvPr id="48" name="Rectangle 47">
             <a:extLst>
               <a:ext uri="{FF2B5EF4-FFF2-40B4-BE49-F238E27FC236}">
                 <a16:creationId xmlns:a16="http://schemas.microsoft.com/office/drawing/2014/main" id="{1702822D-7587-488C-BCDE-6366C82D9F42}"/>
@@ -5225,7 +5226,7 @@
       </p:sp>
       <p:sp>
         <p:nvSpPr>
-          <p:cNvPr id="33" name="Rectangle 32">
+          <p:cNvPr id="50" name="Rectangle 49">
             <a:extLst>
               <a:ext uri="{FF2B5EF4-FFF2-40B4-BE49-F238E27FC236}">
                 <a16:creationId xmlns:a16="http://schemas.microsoft.com/office/drawing/2014/main" id="{2336503F-9C9C-424B-B606-FD55CB6EC94A}"/>

</xml_diff>